<commit_message>
No major change, just changed View
</commit_message>
<xml_diff>
--- a/oslt.pptx
+++ b/oslt.pptx
@@ -249,7 +249,7 @@
           <a:p>
             <a:fld id="{F96CA3DD-1A98-4902-9FD4-45E6B4CA6F39}" type="datetimeFigureOut">
               <a:rPr lang="en-US" smtClean="0"/>
-              <a:t>9/1/2017</a:t>
+              <a:t>8/23/18</a:t>
             </a:fld>
             <a:endParaRPr lang="en-US"/>
           </a:p>
@@ -1867,7 +1867,7 @@
           <a:p>
             <a:fld id="{F96CA3DD-1A98-4902-9FD4-45E6B4CA6F39}" type="datetimeFigureOut">
               <a:rPr lang="en-US" smtClean="0"/>
-              <a:t>9/1/2017</a:t>
+              <a:t>8/23/18</a:t>
             </a:fld>
             <a:endParaRPr lang="en-US"/>
           </a:p>
@@ -2047,7 +2047,7 @@
           <a:p>
             <a:fld id="{F96CA3DD-1A98-4902-9FD4-45E6B4CA6F39}" type="datetimeFigureOut">
               <a:rPr lang="en-US" smtClean="0"/>
-              <a:t>9/1/2017</a:t>
+              <a:t>8/23/18</a:t>
             </a:fld>
             <a:endParaRPr lang="en-US"/>
           </a:p>
@@ -2227,7 +2227,7 @@
           <a:p>
             <a:fld id="{F96CA3DD-1A98-4902-9FD4-45E6B4CA6F39}" type="datetimeFigureOut">
               <a:rPr lang="en-US" smtClean="0"/>
-              <a:t>9/1/2017</a:t>
+              <a:t>8/23/18</a:t>
             </a:fld>
             <a:endParaRPr lang="en-US"/>
           </a:p>
@@ -3926,7 +3926,7 @@
           <a:p>
             <a:fld id="{F96CA3DD-1A98-4902-9FD4-45E6B4CA6F39}" type="datetimeFigureOut">
               <a:rPr lang="en-US" smtClean="0"/>
-              <a:t>9/1/2017</a:t>
+              <a:t>8/23/18</a:t>
             </a:fld>
             <a:endParaRPr lang="en-US"/>
           </a:p>
@@ -4158,7 +4158,7 @@
           <a:p>
             <a:fld id="{F96CA3DD-1A98-4902-9FD4-45E6B4CA6F39}" type="datetimeFigureOut">
               <a:rPr lang="en-US" smtClean="0"/>
-              <a:t>9/1/2017</a:t>
+              <a:t>8/23/18</a:t>
             </a:fld>
             <a:endParaRPr lang="en-US"/>
           </a:p>
@@ -4525,7 +4525,7 @@
           <a:p>
             <a:fld id="{F96CA3DD-1A98-4902-9FD4-45E6B4CA6F39}" type="datetimeFigureOut">
               <a:rPr lang="en-US" smtClean="0"/>
-              <a:t>9/1/2017</a:t>
+              <a:t>8/23/18</a:t>
             </a:fld>
             <a:endParaRPr lang="en-US"/>
           </a:p>
@@ -4648,7 +4648,7 @@
           <a:p>
             <a:fld id="{F96CA3DD-1A98-4902-9FD4-45E6B4CA6F39}" type="datetimeFigureOut">
               <a:rPr lang="en-US" smtClean="0"/>
-              <a:t>9/1/2017</a:t>
+              <a:t>8/23/18</a:t>
             </a:fld>
             <a:endParaRPr lang="en-US"/>
           </a:p>
@@ -4805,7 +4805,7 @@
           <a:p>
             <a:fld id="{F96CA3DD-1A98-4902-9FD4-45E6B4CA6F39}" type="datetimeFigureOut">
               <a:rPr lang="en-US" smtClean="0"/>
-              <a:t>9/1/2017</a:t>
+              <a:t>8/23/18</a:t>
             </a:fld>
             <a:endParaRPr lang="en-US"/>
           </a:p>
@@ -5082,7 +5082,7 @@
           <a:p>
             <a:fld id="{F96CA3DD-1A98-4902-9FD4-45E6B4CA6F39}" type="datetimeFigureOut">
               <a:rPr lang="en-US" smtClean="0"/>
-              <a:t>9/1/2017</a:t>
+              <a:t>8/23/18</a:t>
             </a:fld>
             <a:endParaRPr lang="en-US"/>
           </a:p>
@@ -5335,7 +5335,7 @@
           <a:p>
             <a:fld id="{F96CA3DD-1A98-4902-9FD4-45E6B4CA6F39}" type="datetimeFigureOut">
               <a:rPr lang="en-US" smtClean="0"/>
-              <a:t>9/1/2017</a:t>
+              <a:t>8/23/18</a:t>
             </a:fld>
             <a:endParaRPr lang="en-US"/>
           </a:p>
@@ -5548,7 +5548,7 @@
           <a:p>
             <a:fld id="{F96CA3DD-1A98-4902-9FD4-45E6B4CA6F39}" type="datetimeFigureOut">
               <a:rPr lang="en-US" smtClean="0"/>
-              <a:t>9/1/2017</a:t>
+              <a:t>8/23/18</a:t>
             </a:fld>
             <a:endParaRPr lang="en-US"/>
           </a:p>
@@ -5969,8 +5969,12 @@
           <a:lstStyle/>
           <a:p>
             <a:r>
+              <a:rPr lang="de-DE"/>
+              <a:t>Open </a:t>
+            </a:r>
+            <a:r>
               <a:rPr lang="de-DE" dirty="0"/>
-              <a:t>Open Source </a:t>
+              <a:t>Source </a:t>
             </a:r>
             <a:r>
               <a:rPr lang="de-DE" dirty="0" err="1"/>

</xml_diff>